<commit_message>
minor tweak to one slide
</commit_message>
<xml_diff>
--- a/PowerPoint/00 - Teaching Compiler Design.pptx
+++ b/PowerPoint/00 - Teaching Compiler Design.pptx
@@ -2978,8 +2978,13 @@
             <a:pPr lvl="1"/>
             <a:r>
               <a:rPr lang="en-US" dirty="0"/>
-              <a:t>CVM (virtual machine target for compiler</a:t>
-            </a:r>
+              <a:t>CVM (virtual machine target </a:t>
+            </a:r>
+            <a:r>
+              <a:rPr lang="en-US"/>
+              <a:t>for compiler)</a:t>
+            </a:r>
+            <a:endParaRPr lang="en-US" dirty="0"/>
           </a:p>
           <a:p>
             <a:pPr lvl="1"/>

</xml_diff>

<commit_message>
several minor changes to slides and class TestSource
</commit_message>
<xml_diff>
--- a/PowerPoint/00 - Teaching Compiler Design.pptx
+++ b/PowerPoint/00 - Teaching Compiler Design.pptx
@@ -5,10 +5,10 @@
     <p:sldMasterId id="2147483651" r:id="rId1"/>
   </p:sldMasterIdLst>
   <p:notesMasterIdLst>
-    <p:notesMasterId r:id="rId14"/>
+    <p:notesMasterId r:id="rId13"/>
   </p:notesMasterIdLst>
   <p:handoutMasterIdLst>
-    <p:handoutMasterId r:id="rId15"/>
+    <p:handoutMasterId r:id="rId14"/>
   </p:handoutMasterIdLst>
   <p:sldIdLst>
     <p:sldId id="256" r:id="rId2"/>
@@ -18,11 +18,10 @@
     <p:sldId id="259" r:id="rId6"/>
     <p:sldId id="260" r:id="rId7"/>
     <p:sldId id="261" r:id="rId8"/>
-    <p:sldId id="266" r:id="rId9"/>
-    <p:sldId id="262" r:id="rId10"/>
-    <p:sldId id="263" r:id="rId11"/>
-    <p:sldId id="264" r:id="rId12"/>
-    <p:sldId id="267" r:id="rId13"/>
+    <p:sldId id="262" r:id="rId9"/>
+    <p:sldId id="263" r:id="rId10"/>
+    <p:sldId id="264" r:id="rId11"/>
+    <p:sldId id="267" r:id="rId12"/>
   </p:sldIdLst>
   <p:sldSz cx="9144000" cy="6858000" type="screen4x3"/>
   <p:notesSz cx="7315200" cy="9601200"/>
@@ -2556,7 +2555,7 @@
             </a:br>
             <a:r>
               <a:rPr lang="en-US" sz="2400" dirty="0"/>
-              <a:t>(for ambitious undergraduates or graduate students)</a:t>
+              <a:t>(continued)</a:t>
             </a:r>
           </a:p>
         </p:txBody>
@@ -2578,104 +2577,47 @@
           <a:p>
             <a:r>
               <a:rPr lang="en-US" dirty="0"/>
-              <a:t>Add one or more new features to the language</a:t>
+              <a:t>Implement the project in a different language</a:t>
+            </a:r>
+          </a:p>
+          <a:p>
+            <a:pPr marL="457200" lvl="1" indent="0">
+              <a:buNone/>
+            </a:pPr>
+            <a:r>
+              <a:rPr lang="en-US" dirty="0"/>
+              <a:t>(e.g., C++, Swift, Python, or C#)</a:t>
+            </a:r>
+          </a:p>
+          <a:p>
+            <a:r>
+              <a:rPr lang="en-US" dirty="0"/>
+              <a:t>Implement constraint analysis and code generation using the visitor design pattern</a:t>
+            </a:r>
+          </a:p>
+          <a:p>
+            <a:r>
+              <a:rPr lang="en-US" dirty="0"/>
+              <a:t>Redesign code generation to allow for multiple targets</a:t>
             </a:r>
           </a:p>
           <a:p>
             <a:pPr lvl="1"/>
             <a:r>
-              <a:rPr lang="en-US" dirty="0" err="1"/>
-              <a:t>enum</a:t>
-            </a:r>
-            <a:r>
-              <a:rPr lang="en-US" dirty="0"/>
-              <a:t> types</a:t>
+              <a:rPr lang="en-US" dirty="0"/>
+              <a:t>use a universal, machine-independent back end (e.g., LLVM)</a:t>
             </a:r>
           </a:p>
           <a:p>
             <a:pPr lvl="1"/>
             <a:r>
               <a:rPr lang="en-US" dirty="0"/>
-              <a:t>records/structures (or classes)</a:t>
+              <a:t>use design patterns to create a code-generation factory</a:t>
             </a:r>
           </a:p>
           <a:p>
             <a:pPr lvl="1"/>
-            <a:r>
-              <a:rPr lang="en-US" dirty="0"/>
-              <a:t>references/pointers and dynamic memory allocation (heap)</a:t>
-            </a:r>
-          </a:p>
-          <a:p>
-            <a:pPr lvl="1"/>
-            <a:r>
-              <a:rPr lang="en-US" dirty="0"/>
-              <a:t>predefined environment with </a:t>
-            </a:r>
-            <a:r>
-              <a:rPr lang="en-US" dirty="0" err="1"/>
-              <a:t>builtin</a:t>
-            </a:r>
-            <a:r>
-              <a:rPr lang="en-US" dirty="0"/>
-              <a:t> procedures/functions</a:t>
-            </a:r>
-            <a:br>
-              <a:rPr lang="en-US" dirty="0"/>
-            </a:br>
-            <a:r>
-              <a:rPr lang="en-US" dirty="0"/>
-              <a:t>(make Boolean a predefined </a:t>
-            </a:r>
-            <a:r>
-              <a:rPr lang="en-US" dirty="0" err="1"/>
-              <a:t>enum</a:t>
-            </a:r>
-            <a:r>
-              <a:rPr lang="en-US" dirty="0"/>
-              <a:t> type)</a:t>
-            </a:r>
-          </a:p>
-          <a:p>
-            <a:r>
-              <a:rPr lang="en-US" dirty="0"/>
-              <a:t>Modify target language/machine</a:t>
-            </a:r>
-          </a:p>
-          <a:p>
-            <a:pPr lvl="1"/>
-            <a:r>
-              <a:rPr lang="en-US" dirty="0"/>
-              <a:t>real machine, or assembly language for a real machine</a:t>
-            </a:r>
-            <a:br>
-              <a:rPr lang="en-US" dirty="0"/>
-            </a:br>
-            <a:r>
-              <a:rPr lang="en-US" dirty="0"/>
-              <a:t>(e.g., Intel x86)</a:t>
-            </a:r>
-          </a:p>
-          <a:p>
-            <a:pPr lvl="1"/>
-            <a:r>
-              <a:rPr lang="en-US" dirty="0"/>
-              <a:t>JVM or assembly language for JVM</a:t>
-            </a:r>
-          </a:p>
-          <a:p>
-            <a:pPr lvl="1"/>
-            <a:r>
-              <a:rPr lang="en-US" dirty="0"/>
-              <a:t>Common Language Runtime (part of Microsoft’s .NET Framework)</a:t>
-            </a:r>
-          </a:p>
-          <a:p>
-            <a:pPr lvl="1"/>
-            <a:r>
-              <a:rPr lang="en-US" dirty="0"/>
-              <a:t>C programming language (e.g., first C++ “compilers”)</a:t>
-            </a:r>
+            <a:endParaRPr lang="en-US" dirty="0"/>
           </a:p>
         </p:txBody>
       </p:sp>
@@ -2732,7 +2674,7 @@
     </p:spTree>
     <p:extLst>
       <p:ext uri="{BB962C8B-B14F-4D97-AF65-F5344CB8AC3E}">
-        <p14:creationId xmlns:p14="http://schemas.microsoft.com/office/powerpoint/2010/main" val="2898978080"/>
+        <p14:creationId xmlns:p14="http://schemas.microsoft.com/office/powerpoint/2010/main" val="1078435661"/>
       </p:ext>
     </p:extLst>
   </p:cSld>
@@ -2761,167 +2703,6 @@
       </p:grpSpPr>
       <p:sp>
         <p:nvSpPr>
-          <p:cNvPr id="2" name="Title 1"/>
-          <p:cNvSpPr>
-            <a:spLocks noGrp="1"/>
-          </p:cNvSpPr>
-          <p:nvPr>
-            <p:ph type="title"/>
-          </p:nvPr>
-        </p:nvSpPr>
-        <p:spPr/>
-        <p:txBody>
-          <a:bodyPr/>
-          <a:lstStyle/>
-          <a:p>
-            <a:r>
-              <a:rPr lang="en-US" dirty="0"/>
-              <a:t>Challenging Project Variations</a:t>
-            </a:r>
-            <a:br>
-              <a:rPr lang="en-US" dirty="0"/>
-            </a:br>
-            <a:r>
-              <a:rPr lang="en-US" sz="2400" dirty="0"/>
-              <a:t>(continued)</a:t>
-            </a:r>
-          </a:p>
-        </p:txBody>
-      </p:sp>
-      <p:sp>
-        <p:nvSpPr>
-          <p:cNvPr id="3" name="Content Placeholder 2"/>
-          <p:cNvSpPr>
-            <a:spLocks noGrp="1"/>
-          </p:cNvSpPr>
-          <p:nvPr>
-            <p:ph idx="1"/>
-          </p:nvPr>
-        </p:nvSpPr>
-        <p:spPr/>
-        <p:txBody>
-          <a:bodyPr/>
-          <a:lstStyle/>
-          <a:p>
-            <a:r>
-              <a:rPr lang="en-US" dirty="0"/>
-              <a:t>Implement the project in a language other than Kotlin (e.g., Java, C++, Python, or C#)</a:t>
-            </a:r>
-          </a:p>
-          <a:p>
-            <a:r>
-              <a:rPr lang="en-US" dirty="0"/>
-              <a:t>Implement constraint analysis and code generation using the visitor design pattern</a:t>
-            </a:r>
-          </a:p>
-          <a:p>
-            <a:r>
-              <a:rPr lang="en-US" dirty="0"/>
-              <a:t>Redesign code generation to allow for multiple targets</a:t>
-            </a:r>
-          </a:p>
-          <a:p>
-            <a:pPr lvl="1"/>
-            <a:r>
-              <a:rPr lang="en-US" dirty="0"/>
-              <a:t>use a universal, machine-independent back end (e.g., LLVM)</a:t>
-            </a:r>
-          </a:p>
-          <a:p>
-            <a:pPr lvl="1"/>
-            <a:r>
-              <a:rPr lang="en-US" dirty="0"/>
-              <a:t>use design patterns to create a code-generation factory</a:t>
-            </a:r>
-          </a:p>
-          <a:p>
-            <a:pPr lvl="1"/>
-            <a:endParaRPr lang="en-US" dirty="0"/>
-          </a:p>
-        </p:txBody>
-      </p:sp>
-      <p:sp>
-        <p:nvSpPr>
-          <p:cNvPr id="4" name="Footer Placeholder 3"/>
-          <p:cNvSpPr>
-            <a:spLocks noGrp="1"/>
-          </p:cNvSpPr>
-          <p:nvPr>
-            <p:ph type="ftr" sz="quarter" idx="10"/>
-          </p:nvPr>
-        </p:nvSpPr>
-        <p:spPr/>
-        <p:txBody>
-          <a:bodyPr/>
-          <a:lstStyle/>
-          <a:p>
-            <a:r>
-              <a:rPr lang="en-US"/>
-              <a:t>©SoftMoore Consulting</a:t>
-            </a:r>
-          </a:p>
-        </p:txBody>
-      </p:sp>
-      <p:sp>
-        <p:nvSpPr>
-          <p:cNvPr id="5" name="Slide Number Placeholder 4"/>
-          <p:cNvSpPr>
-            <a:spLocks noGrp="1"/>
-          </p:cNvSpPr>
-          <p:nvPr>
-            <p:ph type="sldNum" sz="quarter" idx="11"/>
-          </p:nvPr>
-        </p:nvSpPr>
-        <p:spPr/>
-        <p:txBody>
-          <a:bodyPr/>
-          <a:lstStyle/>
-          <a:p>
-            <a:r>
-              <a:rPr lang="en-US"/>
-              <a:t>Slide </a:t>
-            </a:r>
-            <a:fld id="{8BB80151-2449-435E-BE2D-33BFC1CA30E8}" type="slidenum">
-              <a:rPr lang="en-US" smtClean="0"/>
-              <a:pPr/>
-              <a:t>11</a:t>
-            </a:fld>
-            <a:endParaRPr lang="en-US"/>
-          </a:p>
-        </p:txBody>
-      </p:sp>
-    </p:spTree>
-    <p:extLst>
-      <p:ext uri="{BB962C8B-B14F-4D97-AF65-F5344CB8AC3E}">
-        <p14:creationId xmlns:p14="http://schemas.microsoft.com/office/powerpoint/2010/main" val="1078435661"/>
-      </p:ext>
-    </p:extLst>
-  </p:cSld>
-  <p:clrMapOvr>
-    <a:masterClrMapping/>
-  </p:clrMapOvr>
-</p:sld>
-</file>
-
-<file path=ppt/slides/slide12.xml><?xml version="1.0" encoding="utf-8"?>
-<p:sld xmlns:a="http://schemas.openxmlformats.org/drawingml/2006/main" xmlns:r="http://schemas.openxmlformats.org/officeDocument/2006/relationships" xmlns:p="http://schemas.openxmlformats.org/presentationml/2006/main">
-  <p:cSld>
-    <p:spTree>
-      <p:nvGrpSpPr>
-        <p:cNvPr id="1" name=""/>
-        <p:cNvGrpSpPr/>
-        <p:nvPr/>
-      </p:nvGrpSpPr>
-      <p:grpSpPr>
-        <a:xfrm>
-          <a:off x="0" y="0"/>
-          <a:ext cx="0" cy="0"/>
-          <a:chOff x="0" y="0"/>
-          <a:chExt cx="0" cy="0"/>
-        </a:xfrm>
-      </p:grpSpPr>
-      <p:sp>
-        <p:nvSpPr>
           <p:cNvPr id="2" name="Title 1">
             <a:extLst>
               <a:ext uri="{FF2B5EF4-FFF2-40B4-BE49-F238E27FC236}">
@@ -2971,20 +2752,15 @@
           <a:p>
             <a:r>
               <a:rPr lang="en-US" dirty="0"/>
-              <a:t>Kotlin source code for</a:t>
+              <a:t>Source code for</a:t>
             </a:r>
           </a:p>
           <a:p>
             <a:pPr lvl="1"/>
             <a:r>
               <a:rPr lang="en-US" dirty="0"/>
-              <a:t>CVM (virtual machine target </a:t>
-            </a:r>
-            <a:r>
-              <a:rPr lang="en-US"/>
-              <a:t>for compiler)</a:t>
-            </a:r>
-            <a:endParaRPr lang="en-US" dirty="0"/>
+              <a:t>CVM (virtual machine target for compiler)</a:t>
+            </a:r>
           </a:p>
           <a:p>
             <a:pPr lvl="1"/>
@@ -3003,7 +2779,7 @@
           <a:p>
             <a:r>
               <a:rPr lang="en-US" dirty="0"/>
-              <a:t>Kotlin source code or skeletal source code for various parts of the compiler</a:t>
+              <a:t>Source code or skeletal source code for various parts of the compiler</a:t>
             </a:r>
           </a:p>
           <a:p>
@@ -3082,7 +2858,7 @@
             <a:fld id="{8BB80151-2449-435E-BE2D-33BFC1CA30E8}" type="slidenum">
               <a:rPr lang="en-US" smtClean="0"/>
               <a:pPr/>
-              <a:t>12</a:t>
+              <a:t>11</a:t>
             </a:fld>
             <a:endParaRPr lang="en-US"/>
           </a:p>
@@ -3134,10 +2910,9 @@
           <a:lstStyle/>
           <a:p>
             <a:r>
-              <a:rPr lang="en-US"/>
-              <a:t>Compiler Course for Undergraduates</a:t>
-            </a:r>
-            <a:endParaRPr lang="en-US" dirty="0"/>
+              <a:rPr lang="en-US" dirty="0"/>
+              <a:t>Teaching Compiler Design</a:t>
+            </a:r>
           </a:p>
         </p:txBody>
       </p:sp>
@@ -3214,13 +2989,6 @@
             <a:r>
               <a:rPr lang="en-US" dirty="0"/>
               <a:t>simplifies code generation</a:t>
-            </a:r>
-          </a:p>
-          <a:p>
-            <a:pPr lvl="2"/>
-            <a:r>
-              <a:rPr lang="en-US" dirty="0"/>
-              <a:t>eliminates having to deal with general-purpose registers</a:t>
             </a:r>
           </a:p>
           <a:p>
@@ -3433,7 +3201,7 @@
                 <a:latin typeface="Arial" panose="020B0604020202020204" pitchFamily="34" charset="0"/>
                 <a:cs typeface="Arial" panose="020B0604020202020204" pitchFamily="34" charset="0"/>
               </a:rPr>
-              <a:t>programming experience in both high-level and low-level languages (e.g., Kotlin and assembly language)</a:t>
+              <a:t>programming experience in both high-level and low-level languages (e.g., Java/Kotlin/C# and assembly language)</a:t>
             </a:r>
           </a:p>
           <a:p>
@@ -3722,7 +3490,55 @@
                 <a:latin typeface="Arial" panose="020B0604020202020204" pitchFamily="34" charset="0"/>
                 <a:cs typeface="Arial" panose="020B0604020202020204" pitchFamily="34" charset="0"/>
               </a:rPr>
-              <a:t>no tools other than compiler and IDE (e.g., Kotlin and IntelliJ IDEA)</a:t>
+              <a:t>no tools other than compiler and IDE; e.g.,</a:t>
+            </a:r>
+          </a:p>
+          <a:p>
+            <a:pPr lvl="2"/>
+            <a:r>
+              <a:rPr lang="en-US" dirty="0">
+                <a:latin typeface="Arial" panose="020B0604020202020204" pitchFamily="34" charset="0"/>
+                <a:cs typeface="Arial" panose="020B0604020202020204" pitchFamily="34" charset="0"/>
+              </a:rPr>
+              <a:t>Java and Eclipse	   </a:t>
+            </a:r>
+            <a:r>
+              <a:rPr lang="en-US" sz="2000" dirty="0">
+                <a:latin typeface="Arial" panose="020B0604020202020204" pitchFamily="34" charset="0"/>
+                <a:cs typeface="Arial" panose="020B0604020202020204" pitchFamily="34" charset="0"/>
+              </a:rPr>
+              <a:t>•</a:t>
+            </a:r>
+            <a:r>
+              <a:rPr lang="en-US" dirty="0">
+                <a:latin typeface="Arial" panose="020B0604020202020204" pitchFamily="34" charset="0"/>
+                <a:cs typeface="Arial" panose="020B0604020202020204" pitchFamily="34" charset="0"/>
+              </a:rPr>
+              <a:t>  C# and Visual Studio</a:t>
+            </a:r>
+          </a:p>
+          <a:p>
+            <a:pPr lvl="2"/>
+            <a:r>
+              <a:rPr lang="en-US" dirty="0">
+                <a:latin typeface="Arial" panose="020B0604020202020204" pitchFamily="34" charset="0"/>
+                <a:cs typeface="Arial" panose="020B0604020202020204" pitchFamily="34" charset="0"/>
+              </a:rPr>
+              <a:t>Kotlin and IntelliJ IDEA	   </a:t>
+            </a:r>
+            <a:r>
+              <a:rPr lang="en-US" sz="2000" dirty="0">
+                <a:latin typeface="Arial" panose="020B0604020202020204" pitchFamily="34" charset="0"/>
+                <a:cs typeface="Arial" panose="020B0604020202020204" pitchFamily="34" charset="0"/>
+              </a:rPr>
+              <a:t>•</a:t>
+            </a:r>
+            <a:r>
+              <a:rPr lang="en-US" dirty="0">
+                <a:latin typeface="Arial" panose="020B0604020202020204" pitchFamily="34" charset="0"/>
+                <a:cs typeface="Arial" panose="020B0604020202020204" pitchFamily="34" charset="0"/>
+              </a:rPr>
+              <a:t>  C++ and Visual Studio Code</a:t>
             </a:r>
           </a:p>
         </p:txBody>
@@ -3891,7 +3707,7 @@
                 <a:latin typeface="Arial" panose="020B0604020202020204" pitchFamily="34" charset="0"/>
                 <a:cs typeface="Arial" panose="020B0604020202020204" pitchFamily="34" charset="0"/>
               </a:rPr>
-              <a:t>number of lookahead tokens?</a:t>
+              <a:t>number of lookahead symbols/tokens?</a:t>
             </a:r>
           </a:p>
           <a:p>
@@ -3923,7 +3739,7 @@
                 <a:latin typeface="Arial" panose="020B0604020202020204" pitchFamily="34" charset="0"/>
                 <a:cs typeface="Arial" panose="020B0604020202020204" pitchFamily="34" charset="0"/>
               </a:rPr>
-              <a:t>recursive descent (top down) with one token lookahead</a:t>
+              <a:t>recursive descent (top down) with k lookahead symbols: LL(k)</a:t>
             </a:r>
           </a:p>
           <a:p>
@@ -3964,7 +3780,27 @@
                 <a:latin typeface="Arial" panose="020B0604020202020204" pitchFamily="34" charset="0"/>
                 <a:cs typeface="Arial" panose="020B0604020202020204" pitchFamily="34" charset="0"/>
               </a:rPr>
+              <a:t>both</a:t>
+            </a:r>
+          </a:p>
+          <a:p>
+            <a:pPr lvl="2"/>
+            <a:r>
+              <a:rPr lang="en-US" dirty="0">
+                <a:latin typeface="Arial" panose="020B0604020202020204" pitchFamily="34" charset="0"/>
+                <a:cs typeface="Arial" panose="020B0604020202020204" pitchFamily="34" charset="0"/>
+              </a:rPr>
               <a:t>abstract syntax trees (high-level, target machine independent)</a:t>
+            </a:r>
+          </a:p>
+          <a:p>
+            <a:pPr lvl="2"/>
+            <a:r>
+              <a:rPr lang="en-US" dirty="0">
+                <a:latin typeface="Arial" panose="020B0604020202020204" pitchFamily="34" charset="0"/>
+                <a:cs typeface="Arial" panose="020B0604020202020204" pitchFamily="34" charset="0"/>
+              </a:rPr>
+              <a:t>assembly language for virtual machine is low-level representation</a:t>
             </a:r>
           </a:p>
         </p:txBody>
@@ -4240,14 +4076,8 @@
                 <a:latin typeface="Arial" panose="020B0604020202020204" pitchFamily="34" charset="0"/>
                 <a:cs typeface="Arial" panose="020B0604020202020204" pitchFamily="34" charset="0"/>
               </a:rPr>
-              <a:t>flexible, but Kotlin is recommended.  Slides, handouts, and skeletal code all use Kotlin.</a:t>
-            </a:r>
-          </a:p>
-          <a:p>
-            <a:endParaRPr lang="en-US" dirty="0">
-              <a:latin typeface="Arial" panose="020B0604020202020204" pitchFamily="34" charset="0"/>
-              <a:cs typeface="Arial" panose="020B0604020202020204" pitchFamily="34" charset="0"/>
-            </a:endParaRPr>
+              <a:t>flexible, but Java, Kotlin, C#, Python, Swift, or C++ are recommended</a:t>
+            </a:r>
           </a:p>
         </p:txBody>
       </p:sp>
@@ -4432,7 +4262,7 @@
                 <a:latin typeface="Arial" panose="020B0604020202020204" pitchFamily="34" charset="0"/>
                 <a:cs typeface="Arial" panose="020B0604020202020204" pitchFamily="34" charset="0"/>
               </a:rPr>
-              <a:t>virtual machine (similar to JVM but simpler)</a:t>
+              <a:t>virtual machine CVM (similar to JVM but simpler)</a:t>
             </a:r>
           </a:p>
           <a:p>
@@ -4540,14 +4370,7 @@
           <a:p>
             <a:r>
               <a:rPr lang="en-US" dirty="0"/>
-              <a:t>A Quote on LL(1)</a:t>
-            </a:r>
-            <a:br>
-              <a:rPr lang="en-US" dirty="0"/>
-            </a:br>
-            <a:r>
-              <a:rPr lang="en-US" dirty="0"/>
-              <a:t>Recursive Descent Parsers</a:t>
+              <a:t>Course Project</a:t>
             </a:r>
           </a:p>
         </p:txBody>
@@ -4564,7 +4387,7 @@
         </p:nvSpPr>
         <p:spPr/>
         <p:txBody>
-          <a:bodyPr lIns="274320" tIns="182880" rIns="274320"/>
+          <a:bodyPr/>
           <a:lstStyle/>
           <a:p>
             <a:pPr marL="0" indent="0">
@@ -4572,14 +4395,47 @@
             </a:pPr>
             <a:r>
               <a:rPr lang="en-US" dirty="0"/>
-              <a:t>“This pattern shows how to implement parsing decisions that use a single token of lookahead.  It’s the weakest form of recursive-descent parser, but the easiest to understand and implement.  If you can conveniently implement your language with this LL(1) pattern you should do so.”     – Terence Parr</a:t>
-            </a:r>
-          </a:p>
-          <a:p>
-            <a:pPr marL="0" indent="0">
-              <a:buNone/>
-            </a:pPr>
-            <a:endParaRPr lang="en-US" dirty="0"/>
+              <a:t>Implementation of a compiler for a small programming language</a:t>
+            </a:r>
+          </a:p>
+          <a:p>
+            <a:r>
+              <a:rPr lang="en-US" dirty="0"/>
+              <a:t>Simple source language (CPRL)</a:t>
+            </a:r>
+          </a:p>
+          <a:p>
+            <a:r>
+              <a:rPr lang="en-US" dirty="0"/>
+              <a:t>Simple target language (assembly language for CVM, a simple stack-based virtual machine)</a:t>
+            </a:r>
+          </a:p>
+          <a:p>
+            <a:r>
+              <a:rPr lang="en-US" dirty="0"/>
+              <a:t>Build a compiler </a:t>
+            </a:r>
+            <a:r>
+              <a:rPr lang="en-US" b="1" dirty="0"/>
+              <a:t>one step at a time</a:t>
+            </a:r>
+            <a:r>
+              <a:rPr lang="en-US" dirty="0"/>
+              <a:t>.</a:t>
+            </a:r>
+          </a:p>
+          <a:p>
+            <a:pPr lvl="1"/>
+            <a:r>
+              <a:rPr lang="en-US" dirty="0"/>
+              <a:t>series of several smaller subprojects</a:t>
+            </a:r>
+          </a:p>
+          <a:p>
+            <a:r>
+              <a:rPr lang="en-US" dirty="0"/>
+              <a:t>Lots of template source code to guide you through the process</a:t>
+            </a:r>
           </a:p>
         </p:txBody>
       </p:sp>
@@ -4598,9 +4454,6 @@
           <a:bodyPr/>
           <a:lstStyle/>
           <a:p>
-            <a:pPr>
-              <a:defRPr/>
-            </a:pPr>
             <a:r>
               <a:rPr lang="en-US"/>
               <a:t>©SoftMoore Consulting</a:t>
@@ -4623,18 +4476,13 @@
           <a:bodyPr/>
           <a:lstStyle/>
           <a:p>
-            <a:pPr>
-              <a:defRPr/>
-            </a:pPr>
             <a:r>
               <a:rPr lang="en-US"/>
               <a:t>Slide </a:t>
             </a:r>
-            <a:fld id="{0F05040F-3DD5-4422-8E21-6095A5B4132F}" type="slidenum">
+            <a:fld id="{8BB80151-2449-435E-BE2D-33BFC1CA30E8}" type="slidenum">
               <a:rPr lang="en-US" smtClean="0"/>
-              <a:pPr>
-                <a:defRPr/>
-              </a:pPr>
+              <a:pPr/>
               <a:t>8</a:t>
             </a:fld>
             <a:endParaRPr lang="en-US"/>
@@ -4644,7 +4492,7 @@
     </p:spTree>
     <p:extLst>
       <p:ext uri="{BB962C8B-B14F-4D97-AF65-F5344CB8AC3E}">
-        <p14:creationId xmlns:p14="http://schemas.microsoft.com/office/powerpoint/2010/main" val="3847228603"/>
+        <p14:creationId xmlns:p14="http://schemas.microsoft.com/office/powerpoint/2010/main" val="3887586885"/>
       </p:ext>
     </p:extLst>
   </p:cSld>
@@ -4688,7 +4536,14 @@
           <a:p>
             <a:r>
               <a:rPr lang="en-US" dirty="0"/>
-              <a:t>Course Project</a:t>
+              <a:t>Challenging Project Variations</a:t>
+            </a:r>
+            <a:br>
+              <a:rPr lang="en-US" dirty="0"/>
+            </a:br>
+            <a:r>
+              <a:rPr lang="en-US" sz="2400" dirty="0"/>
+              <a:t>(for ambitious undergraduates or graduate students)</a:t>
             </a:r>
           </a:p>
         </p:txBody>
@@ -4708,51 +4563,105 @@
           <a:bodyPr/>
           <a:lstStyle/>
           <a:p>
-            <a:pPr marL="0" indent="0">
-              <a:buNone/>
-            </a:pPr>
-            <a:r>
-              <a:rPr lang="en-US" dirty="0"/>
-              <a:t>Implementation of a compiler for a small programming language</a:t>
-            </a:r>
-          </a:p>
-          <a:p>
-            <a:r>
-              <a:rPr lang="en-US" dirty="0"/>
-              <a:t>Simple source language (CPRL)</a:t>
-            </a:r>
-          </a:p>
-          <a:p>
-            <a:r>
-              <a:rPr lang="en-US" dirty="0"/>
-              <a:t>Simple target language (assembly language for CVM, a simple stack-based virtual machine)</a:t>
-            </a:r>
-          </a:p>
-          <a:p>
-            <a:r>
-              <a:rPr lang="en-US" dirty="0"/>
-              <a:t>Build a compiler </a:t>
-            </a:r>
-            <a:r>
-              <a:rPr lang="en-US" b="1" dirty="0"/>
-              <a:t>one step at a time</a:t>
-            </a:r>
-            <a:r>
-              <a:rPr lang="en-US" dirty="0"/>
-              <a:t>.</a:t>
+            <a:r>
+              <a:rPr lang="en-US" dirty="0"/>
+              <a:t>Add one or more new features to the language</a:t>
             </a:r>
           </a:p>
           <a:p>
             <a:pPr lvl="1"/>
             <a:r>
-              <a:rPr lang="en-US" dirty="0"/>
-              <a:t>series of 8 smaller subprojects</a:t>
-            </a:r>
-          </a:p>
-          <a:p>
-            <a:r>
-              <a:rPr lang="en-US" dirty="0"/>
-              <a:t>Lots of template Kotlin code to guide you through the process</a:t>
+              <a:rPr lang="en-US" dirty="0" err="1"/>
+              <a:t>enum</a:t>
+            </a:r>
+            <a:r>
+              <a:rPr lang="en-US" dirty="0"/>
+              <a:t> types</a:t>
+            </a:r>
+          </a:p>
+          <a:p>
+            <a:pPr lvl="1"/>
+            <a:r>
+              <a:rPr lang="en-US" dirty="0"/>
+              <a:t>references/pointers and dynamic memory allocation (heap)</a:t>
+            </a:r>
+          </a:p>
+          <a:p>
+            <a:pPr lvl="1"/>
+            <a:r>
+              <a:rPr lang="en-US" dirty="0"/>
+              <a:t>classes</a:t>
+            </a:r>
+          </a:p>
+          <a:p>
+            <a:pPr lvl="1"/>
+            <a:r>
+              <a:rPr lang="en-US" dirty="0"/>
+              <a:t>predefined environment with </a:t>
+            </a:r>
+            <a:r>
+              <a:rPr lang="en-US" dirty="0" err="1"/>
+              <a:t>builtin</a:t>
+            </a:r>
+            <a:r>
+              <a:rPr lang="en-US" dirty="0"/>
+              <a:t> procedures/functions</a:t>
+            </a:r>
+            <a:br>
+              <a:rPr lang="en-US" dirty="0"/>
+            </a:br>
+            <a:r>
+              <a:rPr lang="en-US" dirty="0"/>
+              <a:t>(make Boolean a predefined </a:t>
+            </a:r>
+            <a:r>
+              <a:rPr lang="en-US" dirty="0" err="1"/>
+              <a:t>enum</a:t>
+            </a:r>
+            <a:r>
+              <a:rPr lang="en-US" dirty="0"/>
+              <a:t> type)</a:t>
+            </a:r>
+          </a:p>
+          <a:p>
+            <a:r>
+              <a:rPr lang="en-US" dirty="0"/>
+              <a:t>Modify target language/machine</a:t>
+            </a:r>
+          </a:p>
+          <a:p>
+            <a:pPr lvl="1"/>
+            <a:r>
+              <a:rPr lang="en-US" dirty="0"/>
+              <a:t>real machine, or assembly language for a real machine</a:t>
+            </a:r>
+            <a:br>
+              <a:rPr lang="en-US" dirty="0"/>
+            </a:br>
+            <a:r>
+              <a:rPr lang="en-US" dirty="0"/>
+              <a:t>(e.g., Intel x86-64)</a:t>
+            </a:r>
+          </a:p>
+          <a:p>
+            <a:pPr lvl="1"/>
+            <a:r>
+              <a:rPr lang="en-US" dirty="0"/>
+              <a:t>JVM or assembly language for JVM</a:t>
+            </a:r>
+          </a:p>
+          <a:p>
+            <a:pPr lvl="1"/>
+            <a:r>
+              <a:rPr lang="en-US" dirty="0"/>
+              <a:t>Common Language Runtime (part of Microsoft’s .NET Framework)</a:t>
+            </a:r>
+          </a:p>
+          <a:p>
+            <a:pPr lvl="1"/>
+            <a:r>
+              <a:rPr lang="en-US" dirty="0"/>
+              <a:t>C programming language (e.g., first C++ “compilers”)</a:t>
             </a:r>
           </a:p>
         </p:txBody>
@@ -4810,7 +4719,7 @@
     </p:spTree>
     <p:extLst>
       <p:ext uri="{BB962C8B-B14F-4D97-AF65-F5344CB8AC3E}">
-        <p14:creationId xmlns:p14="http://schemas.microsoft.com/office/powerpoint/2010/main" val="3887586885"/>
+        <p14:creationId xmlns:p14="http://schemas.microsoft.com/office/powerpoint/2010/main" val="2898978080"/>
       </p:ext>
     </p:extLst>
   </p:cSld>

</xml_diff>